<commit_message>
Feat: Add Data cleaning to notebook
</commit_message>
<xml_diff>
--- a/Julia Superpowers.pptx
+++ b/Julia Superpowers.pptx
@@ -2972,7 +2972,7 @@
           <a:p>
             <a:fld id="{AAEE2B28-A804-48F3-A8B3-A4E6DA5B11F6}" type="datetimeFigureOut">
               <a:rPr lang="en-US" smtClean="0"/>
-              <a:t>1/11/2022</a:t>
+              <a:t>1/31/2022</a:t>
             </a:fld>
             <a:endParaRPr lang="en-US"/>
           </a:p>
@@ -3149,7 +3149,7 @@
           <a:p>
             <a:fld id="{B07709C9-FABE-4B7D-817F-7C96C23A6915}" type="datetimeFigureOut">
               <a:rPr lang="en-US" smtClean="0"/>
-              <a:t>1/11/2022</a:t>
+              <a:t>1/31/2022</a:t>
             </a:fld>
             <a:endParaRPr lang="en-US"/>
           </a:p>

</xml_diff>

<commit_message>
Feat: Add opening question to pp
</commit_message>
<xml_diff>
--- a/Julia Superpowers.pptx
+++ b/Julia Superpowers.pptx
@@ -5,15 +5,16 @@
     <p:sldMasterId id="2147483680" r:id="rId1"/>
   </p:sldMasterIdLst>
   <p:notesMasterIdLst>
-    <p:notesMasterId r:id="rId5"/>
+    <p:notesMasterId r:id="rId6"/>
   </p:notesMasterIdLst>
   <p:handoutMasterIdLst>
-    <p:handoutMasterId r:id="rId6"/>
+    <p:handoutMasterId r:id="rId7"/>
   </p:handoutMasterIdLst>
   <p:sldIdLst>
     <p:sldId id="276" r:id="rId2"/>
-    <p:sldId id="292" r:id="rId3"/>
-    <p:sldId id="293" r:id="rId4"/>
+    <p:sldId id="294" r:id="rId3"/>
+    <p:sldId id="292" r:id="rId4"/>
+    <p:sldId id="293" r:id="rId5"/>
   </p:sldIdLst>
   <p:sldSz cx="12192000" cy="6858000"/>
   <p:notesSz cx="6858000" cy="9144000"/>
@@ -118,6 +119,7 @@
         <p14:section name="Default Section" id="{659DB097-29E0-4993-8D55-F4A00C816A96}">
           <p14:sldIdLst>
             <p14:sldId id="276"/>
+            <p14:sldId id="294"/>
             <p14:sldId id="292"/>
             <p14:sldId id="293"/>
           </p14:sldIdLst>
@@ -3554,7 +3556,7 @@
           <a:p>
             <a:fld id="{7A55B9C1-75D6-4B7F-AF0F-ABF732B21182}" type="slidenum">
               <a:rPr lang="en-US" smtClean="0"/>
-              <a:t>2</a:t>
+              <a:t>3</a:t>
             </a:fld>
             <a:endParaRPr lang="en-US"/>
           </a:p>
@@ -19227,7 +19229,10 @@
           <a:bodyPr/>
           <a:lstStyle/>
           <a:p>
-            <a:endParaRPr lang="en-US"/>
+            <a:r>
+              <a:rPr lang="en-US" dirty="0"/>
+              <a:t>4 February 2022</a:t>
+            </a:r>
           </a:p>
         </p:txBody>
       </p:sp>
@@ -19261,6 +19266,193 @@
           <a:chExt cx="0" cy="0"/>
         </a:xfrm>
       </p:grpSpPr>
+      <mc:AlternateContent xmlns:mc="http://schemas.openxmlformats.org/markup-compatibility/2006">
+        <mc:Choice xmlns:a14="http://schemas.microsoft.com/office/drawing/2010/main" Requires="a14">
+          <p:sp>
+            <p:nvSpPr>
+              <p:cNvPr id="2" name="Title 1">
+                <a:extLst>
+                  <a:ext uri="{FF2B5EF4-FFF2-40B4-BE49-F238E27FC236}">
+                    <a16:creationId xmlns:a16="http://schemas.microsoft.com/office/drawing/2014/main" id="{C8FF00B2-4D87-4D04-8915-64FADD8642AC}"/>
+                  </a:ext>
+                </a:extLst>
+              </p:cNvPr>
+              <p:cNvSpPr>
+                <a:spLocks noGrp="1"/>
+              </p:cNvSpPr>
+              <p:nvPr>
+                <p:ph type="title"/>
+              </p:nvPr>
+            </p:nvSpPr>
+            <p:spPr/>
+            <p:txBody>
+              <a:bodyPr>
+                <a:noAutofit/>
+              </a:bodyPr>
+              <a:lstStyle/>
+              <a:p>
+                <a:r>
+                  <a:rPr lang="en-US" sz="3200" dirty="0"/>
+                  <a:t>What does your computer do when you execute:</a:t>
+                </a:r>
+                <a:br>
+                  <a:rPr lang="en-US" sz="3200" dirty="0"/>
+                </a:br>
+                <a:br>
+                  <a:rPr lang="en-US" sz="3200" dirty="0"/>
+                </a:br>
+                <a:r>
+                  <a:rPr lang="en-US" sz="6000" dirty="0"/>
+                  <a:t>`</a:t>
+                </a:r>
+                <a14:m>
+                  <m:oMath xmlns:m="http://schemas.openxmlformats.org/officeDocument/2006/math">
+                    <m:r>
+                      <a:rPr lang="en-US" sz="6000" i="1" dirty="0" smtClean="0">
+                        <a:latin typeface="Cambria Math" panose="02040503050406030204" pitchFamily="18" charset="0"/>
+                      </a:rPr>
+                      <m:t>𝑥</m:t>
+                    </m:r>
+                    <m:r>
+                      <a:rPr lang="en-US" sz="6000" i="1" dirty="0" smtClean="0">
+                        <a:latin typeface="Cambria Math" panose="02040503050406030204" pitchFamily="18" charset="0"/>
+                      </a:rPr>
+                      <m:t> ∗ </m:t>
+                    </m:r>
+                    <m:r>
+                      <a:rPr lang="en-US" sz="6000" i="1" dirty="0" smtClean="0">
+                        <a:latin typeface="Cambria Math" panose="02040503050406030204" pitchFamily="18" charset="0"/>
+                      </a:rPr>
+                      <m:t>𝑦</m:t>
+                    </m:r>
+                  </m:oMath>
+                </a14:m>
+                <a:r>
+                  <a:rPr lang="en-US" sz="6000" dirty="0"/>
+                  <a:t>` ?</a:t>
+                </a:r>
+                <a:endParaRPr lang="en-US" sz="3200" dirty="0"/>
+              </a:p>
+            </p:txBody>
+          </p:sp>
+        </mc:Choice>
+        <mc:Fallback>
+          <p:sp>
+            <p:nvSpPr>
+              <p:cNvPr id="2" name="Title 1">
+                <a:extLst>
+                  <a:ext uri="{FF2B5EF4-FFF2-40B4-BE49-F238E27FC236}">
+                    <a16:creationId xmlns:a16="http://schemas.microsoft.com/office/drawing/2014/main" id="{C8FF00B2-4D87-4D04-8915-64FADD8642AC}"/>
+                  </a:ext>
+                </a:extLst>
+              </p:cNvPr>
+              <p:cNvSpPr>
+                <a:spLocks noGrp="1" noRot="1" noChangeAspect="1" noMove="1" noResize="1" noEditPoints="1" noAdjustHandles="1" noChangeArrowheads="1" noChangeShapeType="1" noTextEdit="1"/>
+              </p:cNvSpPr>
+              <p:nvPr>
+                <p:ph type="title"/>
+              </p:nvPr>
+            </p:nvSpPr>
+            <p:spPr>
+              <a:blipFill>
+                <a:blip r:embed="rId2"/>
+                <a:stretch>
+                  <a:fillRect l="-1397" t="-15263" r="-1270" b="-86316"/>
+                </a:stretch>
+              </a:blipFill>
+            </p:spPr>
+            <p:txBody>
+              <a:bodyPr/>
+              <a:lstStyle/>
+              <a:p>
+                <a:r>
+                  <a:rPr lang="en-US">
+                    <a:noFill/>
+                  </a:rPr>
+                  <a:t> </a:t>
+                </a:r>
+              </a:p>
+            </p:txBody>
+          </p:sp>
+        </mc:Fallback>
+      </mc:AlternateContent>
+      <p:sp>
+        <p:nvSpPr>
+          <p:cNvPr id="3" name="Slide Number Placeholder 2">
+            <a:extLst>
+              <a:ext uri="{FF2B5EF4-FFF2-40B4-BE49-F238E27FC236}">
+                <a16:creationId xmlns:a16="http://schemas.microsoft.com/office/drawing/2014/main" id="{84F2BB5A-42EF-42CA-A7EA-EE5D1EE0CAAB}"/>
+              </a:ext>
+            </a:extLst>
+          </p:cNvPr>
+          <p:cNvSpPr>
+            <a:spLocks noGrp="1"/>
+          </p:cNvSpPr>
+          <p:nvPr>
+            <p:ph type="sldNum" sz="quarter" idx="12"/>
+          </p:nvPr>
+        </p:nvSpPr>
+        <p:spPr/>
+        <p:txBody>
+          <a:bodyPr/>
+          <a:lstStyle/>
+          <a:p>
+            <a:fld id="{CD6D25CF-0D6E-4844-B79B-06FF722D38A1}" type="slidenum">
+              <a:rPr lang="en-US" smtClean="0"/>
+              <a:t>2</a:t>
+            </a:fld>
+            <a:endParaRPr lang="en-US"/>
+          </a:p>
+        </p:txBody>
+      </p:sp>
+      <p:sp>
+        <p:nvSpPr>
+          <p:cNvPr id="4" name="Picture Placeholder 3">
+            <a:extLst>
+              <a:ext uri="{FF2B5EF4-FFF2-40B4-BE49-F238E27FC236}">
+                <a16:creationId xmlns:a16="http://schemas.microsoft.com/office/drawing/2014/main" id="{BB692171-F4FE-4E2E-B3BA-612230C94EFB}"/>
+              </a:ext>
+            </a:extLst>
+          </p:cNvPr>
+          <p:cNvSpPr>
+            <a:spLocks noGrp="1"/>
+          </p:cNvSpPr>
+          <p:nvPr>
+            <p:ph type="pic" sz="quarter" idx="14"/>
+          </p:nvPr>
+        </p:nvSpPr>
+        <p:spPr/>
+      </p:sp>
+    </p:spTree>
+    <p:extLst>
+      <p:ext uri="{BB962C8B-B14F-4D97-AF65-F5344CB8AC3E}">
+        <p14:creationId xmlns:p14="http://schemas.microsoft.com/office/powerpoint/2010/main" val="377502428"/>
+      </p:ext>
+    </p:extLst>
+  </p:cSld>
+  <p:clrMapOvr>
+    <a:masterClrMapping/>
+  </p:clrMapOvr>
+</p:sld>
+</file>
+
+<file path=ppt/slides/slide3.xml><?xml version="1.0" encoding="utf-8"?>
+<p:sld xmlns:a="http://schemas.openxmlformats.org/drawingml/2006/main" xmlns:r="http://schemas.openxmlformats.org/officeDocument/2006/relationships" xmlns:p="http://schemas.openxmlformats.org/presentationml/2006/main">
+  <p:cSld>
+    <p:spTree>
+      <p:nvGrpSpPr>
+        <p:cNvPr id="1" name=""/>
+        <p:cNvGrpSpPr/>
+        <p:nvPr/>
+      </p:nvGrpSpPr>
+      <p:grpSpPr>
+        <a:xfrm>
+          <a:off x="0" y="0"/>
+          <a:ext cx="0" cy="0"/>
+          <a:chOff x="0" y="0"/>
+          <a:chExt cx="0" cy="0"/>
+        </a:xfrm>
+      </p:grpSpPr>
       <p:sp>
         <p:nvSpPr>
           <p:cNvPr id="12" name="Title 11">
@@ -19343,7 +19535,7 @@
           <a:p>
             <a:fld id="{CD6D25CF-0D6E-4844-B79B-06FF722D38A1}" type="slidenum">
               <a:rPr lang="en-US" smtClean="0"/>
-              <a:t>2</a:t>
+              <a:t>3</a:t>
             </a:fld>
             <a:endParaRPr lang="en-US"/>
           </a:p>
@@ -19380,7 +19572,7 @@
 </p:sld>
 </file>
 
-<file path=ppt/slides/slide3.xml><?xml version="1.0" encoding="utf-8"?>
+<file path=ppt/slides/slide4.xml><?xml version="1.0" encoding="utf-8"?>
 <p:sld xmlns:a="http://schemas.openxmlformats.org/drawingml/2006/main" xmlns:r="http://schemas.openxmlformats.org/officeDocument/2006/relationships" xmlns:p="http://schemas.openxmlformats.org/presentationml/2006/main">
   <p:cSld>
     <p:spTree>
@@ -19441,7 +19633,12 @@
             <p:ph sz="half" idx="2"/>
           </p:nvPr>
         </p:nvSpPr>
-        <p:spPr/>
+        <p:spPr>
+          <a:xfrm>
+            <a:off x="835152" y="1838342"/>
+            <a:ext cx="10515600" cy="4013104"/>
+          </a:xfrm>
+        </p:spPr>
         <p:txBody>
           <a:bodyPr/>
           <a:lstStyle/>
@@ -19449,6 +19646,12 @@
             <a:r>
               <a:rPr lang="en-US" dirty="0"/>
               <a:t>Declare types where you know them (mostly optional)</a:t>
+            </a:r>
+          </a:p>
+          <a:p>
+            <a:r>
+              <a:rPr lang="en-US" dirty="0"/>
+              <a:t>Don’t use Global Variables</a:t>
             </a:r>
           </a:p>
           <a:p>

</xml_diff>